<commit_message>
fixed small text error (copy-paste)
</commit_message>
<xml_diff>
--- a/12 Configuration/Configuration-1.pptx
+++ b/12 Configuration/Configuration-1.pptx
@@ -144,6 +144,58 @@
 </p:presentation>
 </file>
 
+<file path=ppt/changesInfos/changesInfo1.xml><?xml version="1.0" encoding="utf-8"?>
+<pc:chgInfo xmlns:a="http://schemas.openxmlformats.org/drawingml/2006/main" xmlns:r="http://schemas.openxmlformats.org/officeDocument/2006/relationships" xmlns:ac="http://schemas.microsoft.com/office/drawing/2013/main/command" xmlns:pc="http://schemas.microsoft.com/office/powerpoint/2013/main/command">
+  <pc:docChgLst>
+    <pc:chgData name="Michael Sørensen Loft" userId="42949a3e-5aba-4e5d-931a-6d7b2cf6ec97" providerId="ADAL" clId="{FA52C119-A23A-4EFB-B8A5-4BE503ADFC14}"/>
+    <pc:docChg chg="modSld">
+      <pc:chgData name="Michael Sørensen Loft" userId="42949a3e-5aba-4e5d-931a-6d7b2cf6ec97" providerId="ADAL" clId="{FA52C119-A23A-4EFB-B8A5-4BE503ADFC14}" dt="2025-11-06T12:09:52.044" v="133" actId="20577"/>
+      <pc:docMkLst>
+        <pc:docMk/>
+      </pc:docMkLst>
+      <pc:sldChg chg="modSp mod">
+        <pc:chgData name="Michael Sørensen Loft" userId="42949a3e-5aba-4e5d-931a-6d7b2cf6ec97" providerId="ADAL" clId="{FA52C119-A23A-4EFB-B8A5-4BE503ADFC14}" dt="2025-11-06T12:09:52.044" v="133" actId="20577"/>
+        <pc:sldMkLst>
+          <pc:docMk/>
+          <pc:sldMk cId="4049658727" sldId="331"/>
+        </pc:sldMkLst>
+        <pc:spChg chg="mod">
+          <ac:chgData name="Michael Sørensen Loft" userId="42949a3e-5aba-4e5d-931a-6d7b2cf6ec97" providerId="ADAL" clId="{FA52C119-A23A-4EFB-B8A5-4BE503ADFC14}" dt="2025-11-06T12:09:52.044" v="133" actId="20577"/>
+          <ac:spMkLst>
+            <pc:docMk/>
+            <pc:sldMk cId="4049658727" sldId="331"/>
+            <ac:spMk id="6" creationId="{00000000-0000-0000-0000-000000000000}"/>
+          </ac:spMkLst>
+        </pc:spChg>
+      </pc:sldChg>
+      <pc:sldChg chg="modSp mod">
+        <pc:chgData name="Michael Sørensen Loft" userId="42949a3e-5aba-4e5d-931a-6d7b2cf6ec97" providerId="ADAL" clId="{FA52C119-A23A-4EFB-B8A5-4BE503ADFC14}" dt="2025-11-05T21:22:23.597" v="114" actId="20577"/>
+        <pc:sldMkLst>
+          <pc:docMk/>
+          <pc:sldMk cId="2947379116" sldId="338"/>
+        </pc:sldMkLst>
+        <pc:spChg chg="mod">
+          <ac:chgData name="Michael Sørensen Loft" userId="42949a3e-5aba-4e5d-931a-6d7b2cf6ec97" providerId="ADAL" clId="{FA52C119-A23A-4EFB-B8A5-4BE503ADFC14}" dt="2025-11-05T21:22:23.597" v="114" actId="20577"/>
+          <ac:spMkLst>
+            <pc:docMk/>
+            <pc:sldMk cId="2947379116" sldId="338"/>
+            <ac:spMk id="3" creationId="{00000000-0000-0000-0000-000000000000}"/>
+          </ac:spMkLst>
+        </pc:spChg>
+        <pc:spChg chg="mod">
+          <ac:chgData name="Michael Sørensen Loft" userId="42949a3e-5aba-4e5d-931a-6d7b2cf6ec97" providerId="ADAL" clId="{FA52C119-A23A-4EFB-B8A5-4BE503ADFC14}" dt="2025-11-05T21:22:21.955" v="113" actId="14100"/>
+          <ac:spMkLst>
+            <pc:docMk/>
+            <pc:sldMk cId="2947379116" sldId="338"/>
+            <ac:spMk id="6" creationId="{63CDE260-C006-D248-906A-EB7A6381FE83}"/>
+          </ac:spMkLst>
+        </pc:spChg>
+      </pc:sldChg>
+    </pc:docChg>
+  </pc:docChgLst>
+</pc:chgInfo>
+</file>
+
 <file path=ppt/notesMasters/notesMaster1.xml><?xml version="1.0" encoding="utf-8"?>
 <p:notesMaster xmlns:a="http://schemas.openxmlformats.org/drawingml/2006/main" xmlns:r="http://schemas.openxmlformats.org/officeDocument/2006/relationships" xmlns:p="http://schemas.openxmlformats.org/presentationml/2006/main">
   <p:cSld>
@@ -226,7 +278,7 @@
           <a:p>
             <a:fld id="{C3D45B35-5990-4A22-9246-3EAB55A12994}" type="datetimeFigureOut">
               <a:rPr lang="da-DK" smtClean="0"/>
-              <a:t>15-11-2023</a:t>
+              <a:t>05-11-2025</a:t>
             </a:fld>
             <a:endParaRPr lang="da-DK"/>
           </a:p>
@@ -6267,13 +6319,6 @@
   <p:clrMapOvr>
     <a:masterClrMapping/>
   </p:clrMapOvr>
-  <p:timing>
-    <p:tnLst>
-      <p:par>
-        <p:cTn id="1" dur="indefinite" restart="never" nodeType="tmRoot"/>
-      </p:par>
-    </p:tnLst>
-  </p:timing>
 </p:sld>
 </file>
 
@@ -6705,22 +6750,16 @@
               <a:t> the </a:t>
             </a:r>
             <a:r>
-              <a:rPr lang="da-DK" sz="2400" dirty="0" err="1" smtClean="0">
+              <a:rPr lang="da-DK" sz="2400" dirty="0" err="1">
                 <a:latin typeface="Gill Sans MT" panose="020B0502020104020203" pitchFamily="34" charset="0"/>
               </a:rPr>
               <a:t>JsonSerializer</a:t>
-            </a:r>
-            <a:r>
-              <a:rPr lang="da-DK" sz="2400" dirty="0" smtClean="0">
-                <a:latin typeface="Gill Sans MT" panose="020B0502020104020203" pitchFamily="34" charset="0"/>
-              </a:rPr>
-              <a:t> </a:t>
             </a:r>
             <a:r>
               <a:rPr lang="da-DK" sz="2400" dirty="0">
                 <a:latin typeface="Gill Sans MT" panose="020B0502020104020203" pitchFamily="34" charset="0"/>
               </a:rPr>
-              <a:t>to save the </a:t>
+              <a:t> to save the </a:t>
             </a:r>
             <a:r>
               <a:rPr lang="da-DK" sz="2400" dirty="0" err="1">
@@ -6759,13 +6798,6 @@
   <p:clrMapOvr>
     <a:masterClrMapping/>
   </p:clrMapOvr>
-  <p:timing>
-    <p:tnLst>
-      <p:par>
-        <p:cTn id="1" dur="indefinite" restart="never" nodeType="tmRoot"/>
-      </p:par>
-    </p:tnLst>
-  </p:timing>
 </p:sld>
 </file>
 
@@ -6885,25 +6917,8 @@
                 <a:latin typeface="Consolas" panose="020B0609020204030204" pitchFamily="49" charset="0"/>
                 <a:cs typeface="Consolas" panose="020B0609020204030204" pitchFamily="49" charset="0"/>
               </a:rPr>
-              <a:t> Load(string </a:t>
-            </a:r>
-            <a:r>
-              <a:rPr lang="en-US" sz="1600" dirty="0" smtClean="0">
-                <a:solidFill>
-                  <a:schemeClr val="tx1"/>
-                </a:solidFill>
-                <a:latin typeface="Consolas" panose="020B0609020204030204" pitchFamily="49" charset="0"/>
-                <a:cs typeface="Consolas" panose="020B0609020204030204" pitchFamily="49" charset="0"/>
-              </a:rPr>
-              <a:t>filename)</a:t>
-            </a:r>
-            <a:endParaRPr lang="en-US" sz="1600" dirty="0">
-              <a:solidFill>
-                <a:schemeClr val="tx1"/>
-              </a:solidFill>
-              <a:latin typeface="Consolas" panose="020B0609020204030204" pitchFamily="49" charset="0"/>
-              <a:cs typeface="Consolas" panose="020B0609020204030204" pitchFamily="49" charset="0"/>
-            </a:endParaRPr>
+              <a:t> Load(string filename)</a:t>
+            </a:r>
           </a:p>
           <a:p>
             <a:r>
@@ -7196,71 +7211,13 @@
               <a:t>":</a:t>
             </a:r>
             <a:r>
-              <a:rPr lang="fr-FR" sz="1400" dirty="0" err="1">
-                <a:solidFill>
-                  <a:schemeClr val="tx1"/>
-                </a:solidFill>
-                <a:latin typeface="Consolas" panose="020B0609020204030204" pitchFamily="49" charset="0"/>
-              </a:rPr>
-              <a:t>true</a:t>
-            </a:r>
-            <a:r>
-              <a:rPr lang="fr-FR" sz="1400" dirty="0">
-                <a:solidFill>
-                  <a:schemeClr val="tx1"/>
-                </a:solidFill>
-                <a:latin typeface="Consolas" panose="020B0609020204030204" pitchFamily="49" charset="0"/>
-              </a:rPr>
-              <a:t>,</a:t>
-            </a:r>
-          </a:p>
-          <a:p>
-            <a:r>
-              <a:rPr lang="fr-FR" sz="1400" dirty="0">
-                <a:solidFill>
-                  <a:schemeClr val="tx1"/>
-                </a:solidFill>
-                <a:latin typeface="Consolas" panose="020B0609020204030204" pitchFamily="49" charset="0"/>
-              </a:rPr>
-              <a:t> "</a:t>
-            </a:r>
-            <a:r>
-              <a:rPr lang="fr-FR" sz="1400" dirty="0" err="1">
-                <a:solidFill>
-                  <a:schemeClr val="tx1"/>
-                </a:solidFill>
-                <a:latin typeface="Consolas" panose="020B0609020204030204" pitchFamily="49" charset="0"/>
-              </a:rPr>
-              <a:t>Locale":"US</a:t>
-            </a:r>
-            <a:r>
-              <a:rPr lang="fr-FR" sz="1400" dirty="0">
-                <a:solidFill>
-                  <a:schemeClr val="tx1"/>
-                </a:solidFill>
-                <a:latin typeface="Consolas" panose="020B0609020204030204" pitchFamily="49" charset="0"/>
-              </a:rPr>
-              <a:t>",</a:t>
-            </a:r>
-          </a:p>
-          <a:p>
-            <a:r>
-              <a:rPr lang="fr-FR" sz="1400" dirty="0">
-                <a:solidFill>
-                  <a:schemeClr val="tx1"/>
-                </a:solidFill>
-                <a:latin typeface="Consolas" panose="020B0609020204030204" pitchFamily="49" charset="0"/>
-              </a:rPr>
-              <a:t> "TimeFormat</a:t>
-            </a:r>
-            <a:r>
-              <a:rPr lang="fr-FR" sz="1400" dirty="0" smtClean="0">
-                <a:solidFill>
-                  <a:schemeClr val="tx1"/>
-                </a:solidFill>
-                <a:latin typeface="Consolas" panose="020B0609020204030204" pitchFamily="49" charset="0"/>
-              </a:rPr>
-              <a:t>":1</a:t>
+              <a:rPr lang="fr-FR" sz="1400">
+                <a:solidFill>
+                  <a:schemeClr val="tx1"/>
+                </a:solidFill>
+                <a:latin typeface="Consolas" panose="020B0609020204030204" pitchFamily="49" charset="0"/>
+              </a:rPr>
+              <a:t>true,</a:t>
             </a:r>
             <a:endParaRPr lang="fr-FR" sz="1400" dirty="0">
               <a:solidFill>
@@ -7268,6 +7225,46 @@
               </a:solidFill>
               <a:latin typeface="Consolas" panose="020B0609020204030204" pitchFamily="49" charset="0"/>
             </a:endParaRPr>
+          </a:p>
+          <a:p>
+            <a:r>
+              <a:rPr lang="fr-FR" sz="1400" dirty="0">
+                <a:solidFill>
+                  <a:schemeClr val="tx1"/>
+                </a:solidFill>
+                <a:latin typeface="Consolas" panose="020B0609020204030204" pitchFamily="49" charset="0"/>
+              </a:rPr>
+              <a:t> "</a:t>
+            </a:r>
+            <a:r>
+              <a:rPr lang="fr-FR" sz="1400" dirty="0" err="1">
+                <a:solidFill>
+                  <a:schemeClr val="tx1"/>
+                </a:solidFill>
+                <a:latin typeface="Consolas" panose="020B0609020204030204" pitchFamily="49" charset="0"/>
+              </a:rPr>
+              <a:t>Locale":"US</a:t>
+            </a:r>
+            <a:r>
+              <a:rPr lang="fr-FR" sz="1400" dirty="0">
+                <a:solidFill>
+                  <a:schemeClr val="tx1"/>
+                </a:solidFill>
+                <a:latin typeface="Consolas" panose="020B0609020204030204" pitchFamily="49" charset="0"/>
+              </a:rPr>
+              <a:t>",</a:t>
+            </a:r>
+          </a:p>
+          <a:p>
+            <a:r>
+              <a:rPr lang="fr-FR" sz="1400" dirty="0">
+                <a:solidFill>
+                  <a:schemeClr val="tx1"/>
+                </a:solidFill>
+                <a:latin typeface="Consolas" panose="020B0609020204030204" pitchFamily="49" charset="0"/>
+              </a:rPr>
+              <a:t> "TimeFormat":1</a:t>
+            </a:r>
           </a:p>
           <a:p>
             <a:r>
@@ -7368,13 +7365,6 @@
   <p:clrMapOvr>
     <a:masterClrMapping/>
   </p:clrMapOvr>
-  <p:timing>
-    <p:tnLst>
-      <p:par>
-        <p:cTn id="1" dur="indefinite" restart="never" nodeType="tmRoot"/>
-      </p:par>
-    </p:tnLst>
-  </p:timing>
 </p:sld>
 </file>
 
@@ -7478,16 +7468,6 @@
                 <a:cs typeface="Consolas" panose="020B0609020204030204" pitchFamily="49" charset="0"/>
               </a:rPr>
               <a:t>NestedConfigurations</a:t>
-            </a:r>
-            <a:r>
-              <a:rPr lang="en-GB" dirty="0">
-                <a:solidFill>
-                  <a:schemeClr val="tx1"/>
-                </a:solidFill>
-                <a:latin typeface="Consolas" panose="020B0609020204030204" pitchFamily="49" charset="0"/>
-                <a:cs typeface="Consolas" panose="020B0609020204030204" pitchFamily="49" charset="0"/>
-              </a:rPr>
-              <a:t/>
             </a:r>
             <a:br>
               <a:rPr lang="en-GB" dirty="0">
@@ -7897,13 +7877,6 @@
   <p:clrMapOvr>
     <a:masterClrMapping/>
   </p:clrMapOvr>
-  <p:timing>
-    <p:tnLst>
-      <p:par>
-        <p:cTn id="1" dur="indefinite" restart="never" nodeType="tmRoot"/>
-      </p:par>
-    </p:tnLst>
-  </p:timing>
 </p:sld>
 </file>
 
@@ -8013,16 +7986,6 @@
               </a:rPr>
               <a:t>AlarmSettings</a:t>
             </a:r>
-            <a:r>
-              <a:rPr lang="en-GB" sz="1600" dirty="0">
-                <a:solidFill>
-                  <a:schemeClr val="tx1"/>
-                </a:solidFill>
-                <a:latin typeface="Consolas" panose="020B0609020204030204" pitchFamily="49" charset="0"/>
-                <a:cs typeface="Consolas" panose="020B0609020204030204" pitchFamily="49" charset="0"/>
-              </a:rPr>
-              <a:t/>
-            </a:r>
             <a:br>
               <a:rPr lang="en-GB" sz="1600" dirty="0">
                 <a:solidFill>
@@ -8091,16 +8054,6 @@
               </a:rPr>
               <a:t>TimeFormatEnum</a:t>
             </a:r>
-            <a:r>
-              <a:rPr lang="en-GB" sz="1600" dirty="0">
-                <a:solidFill>
-                  <a:schemeClr val="tx1"/>
-                </a:solidFill>
-                <a:latin typeface="Consolas" panose="020B0609020204030204" pitchFamily="49" charset="0"/>
-                <a:cs typeface="Consolas" panose="020B0609020204030204" pitchFamily="49" charset="0"/>
-              </a:rPr>
-              <a:t/>
-            </a:r>
             <a:br>
               <a:rPr lang="en-GB" sz="1600" dirty="0">
                 <a:solidFill>
@@ -8179,16 +8132,6 @@
             </a:r>
           </a:p>
           <a:p>
-            <a:r>
-              <a:rPr lang="en-GB" sz="1600" dirty="0">
-                <a:solidFill>
-                  <a:schemeClr val="tx1"/>
-                </a:solidFill>
-                <a:latin typeface="Consolas" panose="020B0609020204030204" pitchFamily="49" charset="0"/>
-                <a:cs typeface="Consolas" panose="020B0609020204030204" pitchFamily="49" charset="0"/>
-              </a:rPr>
-              <a:t/>
-            </a:r>
             <a:br>
               <a:rPr lang="en-GB" sz="1600" dirty="0">
                 <a:solidFill>
@@ -8246,17 +8189,7 @@
                 <a:latin typeface="Consolas" panose="020B0609020204030204" pitchFamily="49" charset="0"/>
                 <a:cs typeface="Consolas" panose="020B0609020204030204" pitchFamily="49" charset="0"/>
               </a:rPr>
-              <a:t> { get; set; </a:t>
-            </a:r>
-            <a:r>
-              <a:rPr lang="en-GB" sz="1600" dirty="0" smtClean="0">
-                <a:solidFill>
-                  <a:schemeClr val="tx1"/>
-                </a:solidFill>
-                <a:latin typeface="Consolas" panose="020B0609020204030204" pitchFamily="49" charset="0"/>
-                <a:cs typeface="Consolas" panose="020B0609020204030204" pitchFamily="49" charset="0"/>
-              </a:rPr>
-              <a:t>}</a:t>
+              <a:t> { get; set; }</a:t>
             </a:r>
           </a:p>
           <a:p>
@@ -8367,7 +8300,7 @@
                 <a:cs typeface="Consolas" panose="020B0609020204030204" pitchFamily="49" charset="0"/>
               </a:rPr>
             </a:br>
-            <a:endParaRPr lang="en-GB" sz="1600" dirty="0" smtClean="0">
+            <a:endParaRPr lang="en-GB" sz="1600" dirty="0">
               <a:solidFill>
                 <a:schemeClr val="tx1"/>
               </a:solidFill>
@@ -8377,32 +8310,22 @@
           </a:p>
           <a:p>
             <a:r>
-              <a:rPr lang="en-GB" sz="1600" dirty="0" smtClean="0">
+              <a:rPr lang="en-GB" sz="1600" dirty="0">
                 <a:solidFill>
                   <a:schemeClr val="tx1"/>
                 </a:solidFill>
                 <a:latin typeface="Consolas" panose="020B0609020204030204" pitchFamily="49" charset="0"/>
                 <a:cs typeface="Consolas" panose="020B0609020204030204" pitchFamily="49" charset="0"/>
               </a:rPr>
-              <a:t>    </a:t>
-            </a:r>
-            <a:r>
-              <a:rPr lang="en-GB" sz="1600" dirty="0">
-                <a:solidFill>
-                  <a:schemeClr val="tx1"/>
-                </a:solidFill>
-                <a:latin typeface="Consolas" panose="020B0609020204030204" pitchFamily="49" charset="0"/>
-                <a:cs typeface="Consolas" panose="020B0609020204030204" pitchFamily="49" charset="0"/>
-              </a:rPr>
-              <a:t>public string Locale { get; set; }</a:t>
-            </a:r>
-          </a:p>
-          <a:p>
-            <a:endParaRPr lang="en-GB" sz="1600" dirty="0" smtClean="0"/>
-          </a:p>
-          <a:p>
-            <a:r>
-              <a:rPr lang="en-GB" sz="1600" dirty="0" smtClean="0"/>
+              <a:t>    public string Locale { get; set; }</a:t>
+            </a:r>
+          </a:p>
+          <a:p>
+            <a:endParaRPr lang="en-GB" sz="1600" dirty="0"/>
+          </a:p>
+          <a:p>
+            <a:r>
+              <a:rPr lang="en-GB" sz="1600" dirty="0"/>
               <a:t>          </a:t>
             </a:r>
             <a:r>
@@ -8642,16 +8565,9 @@
                 <a:latin typeface="Gill Sans MT" panose="020B0502020104020203" pitchFamily="34" charset="0"/>
                 <a:hlinkClick r:id="rId3"/>
               </a:rPr>
-              <a:t>https://</a:t>
-            </a:r>
-            <a:r>
-              <a:rPr lang="da-DK" sz="1200" dirty="0" smtClean="0">
-                <a:latin typeface="Gill Sans MT" panose="020B0502020104020203" pitchFamily="34" charset="0"/>
-                <a:hlinkClick r:id="rId3"/>
-              </a:rPr>
-              <a:t>learn.microsoft.com/en-us/dotnet/standard/serialization/system-text-json/customize-properties?pivots=dotnet-6-0</a:t>
-            </a:r>
-            <a:endParaRPr lang="da-DK" sz="1200" dirty="0" smtClean="0">
+              <a:t>https://learn.microsoft.com/en-us/dotnet/standard/serialization/system-text-json/customize-properties?pivots=dotnet-6-0</a:t>
+            </a:r>
+            <a:endParaRPr lang="da-DK" sz="1200" dirty="0">
               <a:latin typeface="Gill Sans MT" panose="020B0502020104020203" pitchFamily="34" charset="0"/>
             </a:endParaRPr>
           </a:p>
@@ -8661,16 +8577,9 @@
                 <a:latin typeface="Gill Sans MT" panose="020B0502020104020203" pitchFamily="34" charset="0"/>
                 <a:hlinkClick r:id="rId4"/>
               </a:rPr>
-              <a:t>https://</a:t>
-            </a:r>
-            <a:r>
-              <a:rPr lang="da-DK" sz="1200" dirty="0" smtClean="0">
-                <a:latin typeface="Gill Sans MT" panose="020B0502020104020203" pitchFamily="34" charset="0"/>
-                <a:hlinkClick r:id="rId4"/>
-              </a:rPr>
-              <a:t>learn.microsoft.com/en-us/dotnet/standard/serialization/system-text-json/ignore-properties?pivots=dotnet-6-0</a:t>
-            </a:r>
-            <a:endParaRPr lang="da-DK" sz="1200" dirty="0" smtClean="0">
+              <a:t>https://learn.microsoft.com/en-us/dotnet/standard/serialization/system-text-json/ignore-properties?pivots=dotnet-6-0</a:t>
+            </a:r>
+            <a:endParaRPr lang="da-DK" sz="1200" dirty="0">
               <a:latin typeface="Gill Sans MT" panose="020B0502020104020203" pitchFamily="34" charset="0"/>
             </a:endParaRPr>
           </a:p>
@@ -8845,13 +8754,6 @@
   <p:clrMapOvr>
     <a:masterClrMapping/>
   </p:clrMapOvr>
-  <p:timing>
-    <p:tnLst>
-      <p:par>
-        <p:cTn id="1" dur="indefinite" restart="never" nodeType="tmRoot"/>
-      </p:par>
-    </p:tnLst>
-  </p:timing>
 </p:sld>
 </file>
 
@@ -8893,22 +8795,18 @@
             </a:r>
             <a:r>
               <a:rPr lang="da-DK" dirty="0"/>
+              <a:t> – </a:t>
+            </a:r>
+            <a:r>
+              <a:rPr lang="da-DK" dirty="0" err="1"/>
+              <a:t>Readable</a:t>
+            </a:r>
+            <a:r>
+              <a:rPr lang="da-DK" dirty="0"/>
               <a:t> </a:t>
             </a:r>
             <a:r>
-              <a:rPr lang="da-DK" dirty="0" smtClean="0"/>
-              <a:t>– </a:t>
-            </a:r>
-            <a:r>
-              <a:rPr lang="da-DK" dirty="0" err="1" smtClean="0"/>
-              <a:t>Readable</a:t>
-            </a:r>
-            <a:r>
-              <a:rPr lang="da-DK" dirty="0" smtClean="0"/>
-              <a:t> </a:t>
-            </a:r>
-            <a:r>
-              <a:rPr lang="da-DK" dirty="0" err="1" smtClean="0"/>
+              <a:rPr lang="da-DK" dirty="0" err="1"/>
               <a:t>enums</a:t>
             </a:r>
             <a:endParaRPr lang="da-DK" dirty="0"/>
@@ -9016,43 +8914,150 @@
           </a:p>
           <a:p>
             <a:r>
-              <a:rPr lang="da-DK" sz="1400" dirty="0" smtClean="0">
+              <a:rPr lang="da-DK" sz="1400" dirty="0">
                 <a:solidFill>
                   <a:srgbClr val="000000"/>
                 </a:solidFill>
                 <a:latin typeface="Cascadia Mono" panose="020B0609020000020004" pitchFamily="49" charset="0"/>
               </a:rPr>
+              <a:t> {</a:t>
+            </a:r>
+          </a:p>
+          <a:p>
+            <a:r>
+              <a:rPr lang="da-DK" sz="1400" dirty="0">
+                <a:solidFill>
+                  <a:srgbClr val="000000"/>
+                </a:solidFill>
+                <a:latin typeface="Cascadia Mono" panose="020B0609020000020004" pitchFamily="49" charset="0"/>
+              </a:rPr>
+              <a:t>    </a:t>
+            </a:r>
+            <a:r>
+              <a:rPr lang="da-DK" sz="1400" dirty="0" err="1">
+                <a:solidFill>
+                  <a:srgbClr val="000000"/>
+                </a:solidFill>
+                <a:latin typeface="Cascadia Mono" panose="020B0609020000020004" pitchFamily="49" charset="0"/>
+              </a:rPr>
+              <a:t>WriteIndented</a:t>
+            </a:r>
+            <a:r>
+              <a:rPr lang="da-DK" sz="1400" dirty="0">
+                <a:solidFill>
+                  <a:srgbClr val="000000"/>
+                </a:solidFill>
+                <a:latin typeface="Cascadia Mono" panose="020B0609020000020004" pitchFamily="49" charset="0"/>
+              </a:rPr>
+              <a:t> = </a:t>
+            </a:r>
+            <a:r>
+              <a:rPr lang="da-DK" sz="1400" dirty="0">
+                <a:solidFill>
+                  <a:srgbClr val="0000FF"/>
+                </a:solidFill>
+                <a:latin typeface="Cascadia Mono" panose="020B0609020000020004" pitchFamily="49" charset="0"/>
+              </a:rPr>
+              <a:t>true</a:t>
+            </a:r>
+            <a:r>
+              <a:rPr lang="da-DK" sz="1400" dirty="0">
+                <a:solidFill>
+                  <a:srgbClr val="000000"/>
+                </a:solidFill>
+                <a:latin typeface="Cascadia Mono" panose="020B0609020000020004" pitchFamily="49" charset="0"/>
+              </a:rPr>
+              <a:t>,</a:t>
+            </a:r>
+          </a:p>
+          <a:p>
+            <a:r>
+              <a:rPr lang="da-DK" sz="1400" dirty="0">
+                <a:solidFill>
+                  <a:srgbClr val="000000"/>
+                </a:solidFill>
+                <a:latin typeface="Cascadia Mono" panose="020B0609020000020004" pitchFamily="49" charset="0"/>
+              </a:rPr>
+              <a:t>    Converters =</a:t>
+            </a:r>
+          </a:p>
+          <a:p>
+            <a:r>
+              <a:rPr lang="da-DK" sz="1400" dirty="0">
+                <a:solidFill>
+                  <a:srgbClr val="000000"/>
+                </a:solidFill>
+                <a:latin typeface="Cascadia Mono" panose="020B0609020000020004" pitchFamily="49" charset="0"/>
+              </a:rPr>
+              <a:t>    {</a:t>
+            </a:r>
+          </a:p>
+          <a:p>
+            <a:r>
+              <a:rPr lang="da-DK" sz="1400" dirty="0">
+                <a:solidFill>
+                  <a:srgbClr val="000000"/>
+                </a:solidFill>
+                <a:latin typeface="Cascadia Mono" panose="020B0609020000020004" pitchFamily="49" charset="0"/>
+              </a:rPr>
+              <a:t>       </a:t>
+            </a:r>
+            <a:r>
+              <a:rPr lang="da-DK" sz="1400" dirty="0">
+                <a:solidFill>
+                  <a:srgbClr val="0000FF"/>
+                </a:solidFill>
+                <a:latin typeface="Cascadia Mono" panose="020B0609020000020004" pitchFamily="49" charset="0"/>
+              </a:rPr>
+              <a:t>new</a:t>
+            </a:r>
+            <a:r>
+              <a:rPr lang="da-DK" sz="1400" dirty="0">
+                <a:solidFill>
+                  <a:srgbClr val="000000"/>
+                </a:solidFill>
+                <a:latin typeface="Cascadia Mono" panose="020B0609020000020004" pitchFamily="49" charset="0"/>
+              </a:rPr>
               <a:t> </a:t>
             </a:r>
             <a:r>
+              <a:rPr lang="da-DK" sz="1400" dirty="0" err="1">
+                <a:solidFill>
+                  <a:srgbClr val="000000"/>
+                </a:solidFill>
+                <a:latin typeface="Cascadia Mono" panose="020B0609020000020004" pitchFamily="49" charset="0"/>
+              </a:rPr>
+              <a:t>JsonStringEnumConverter</a:t>
+            </a:r>
+            <a:r>
               <a:rPr lang="da-DK" sz="1400" dirty="0">
                 <a:solidFill>
                   <a:srgbClr val="000000"/>
                 </a:solidFill>
                 <a:latin typeface="Cascadia Mono" panose="020B0609020000020004" pitchFamily="49" charset="0"/>
               </a:rPr>
-              <a:t>{</a:t>
-            </a:r>
-          </a:p>
-          <a:p>
-            <a:r>
-              <a:rPr lang="da-DK" sz="1400" dirty="0" smtClean="0">
+              <a:t>(</a:t>
+            </a:r>
+            <a:r>
+              <a:rPr lang="da-DK" sz="1400" dirty="0" err="1">
                 <a:solidFill>
                   <a:srgbClr val="000000"/>
                 </a:solidFill>
                 <a:latin typeface="Cascadia Mono" panose="020B0609020000020004" pitchFamily="49" charset="0"/>
               </a:rPr>
-              <a:t>    </a:t>
-            </a:r>
-            <a:r>
-              <a:rPr lang="da-DK" sz="1400" dirty="0" err="1">
+              <a:t>JsonNamingPolicy.CamelCase</a:t>
+            </a:r>
+            <a:r>
+              <a:rPr lang="da-DK" sz="1400" dirty="0">
                 <a:solidFill>
                   <a:srgbClr val="000000"/>
                 </a:solidFill>
                 <a:latin typeface="Cascadia Mono" panose="020B0609020000020004" pitchFamily="49" charset="0"/>
               </a:rPr>
-              <a:t>WriteIndented</a:t>
-            </a:r>
+              <a:t>)</a:t>
+            </a:r>
+          </a:p>
+          <a:p>
             <a:r>
               <a:rPr lang="da-DK" sz="1400" dirty="0">
                 <a:solidFill>
@@ -9060,162 +9065,21 @@
                 </a:solidFill>
                 <a:latin typeface="Cascadia Mono" panose="020B0609020000020004" pitchFamily="49" charset="0"/>
               </a:rPr>
-              <a:t> = </a:t>
-            </a:r>
+              <a:t>    }</a:t>
+            </a:r>
+          </a:p>
+          <a:p>
             <a:r>
               <a:rPr lang="da-DK" sz="1400" dirty="0">
                 <a:solidFill>
-                  <a:srgbClr val="0000FF"/>
+                  <a:srgbClr val="000000"/>
                 </a:solidFill>
                 <a:latin typeface="Cascadia Mono" panose="020B0609020000020004" pitchFamily="49" charset="0"/>
               </a:rPr>
-              <a:t>true</a:t>
-            </a:r>
-            <a:r>
-              <a:rPr lang="da-DK" sz="1400" dirty="0">
-                <a:solidFill>
-                  <a:srgbClr val="000000"/>
-                </a:solidFill>
-                <a:latin typeface="Cascadia Mono" panose="020B0609020000020004" pitchFamily="49" charset="0"/>
-              </a:rPr>
-              <a:t>,</a:t>
-            </a:r>
-          </a:p>
-          <a:p>
-            <a:r>
-              <a:rPr lang="da-DK" sz="1400" dirty="0" smtClean="0">
-                <a:solidFill>
-                  <a:srgbClr val="000000"/>
-                </a:solidFill>
-                <a:latin typeface="Cascadia Mono" panose="020B0609020000020004" pitchFamily="49" charset="0"/>
-              </a:rPr>
-              <a:t>    </a:t>
-            </a:r>
-            <a:r>
-              <a:rPr lang="da-DK" sz="1400" dirty="0">
-                <a:solidFill>
-                  <a:srgbClr val="000000"/>
-                </a:solidFill>
-                <a:latin typeface="Cascadia Mono" panose="020B0609020000020004" pitchFamily="49" charset="0"/>
-              </a:rPr>
-              <a:t>Converters =</a:t>
-            </a:r>
-          </a:p>
-          <a:p>
-            <a:r>
-              <a:rPr lang="da-DK" sz="1400" dirty="0" smtClean="0">
-                <a:solidFill>
-                  <a:srgbClr val="000000"/>
-                </a:solidFill>
-                <a:latin typeface="Cascadia Mono" panose="020B0609020000020004" pitchFamily="49" charset="0"/>
-              </a:rPr>
-              <a:t>    </a:t>
-            </a:r>
-            <a:r>
-              <a:rPr lang="da-DK" sz="1400" dirty="0">
-                <a:solidFill>
-                  <a:srgbClr val="000000"/>
-                </a:solidFill>
-                <a:latin typeface="Cascadia Mono" panose="020B0609020000020004" pitchFamily="49" charset="0"/>
-              </a:rPr>
-              <a:t>{</a:t>
-            </a:r>
-          </a:p>
-          <a:p>
-            <a:r>
-              <a:rPr lang="da-DK" sz="1400" dirty="0" smtClean="0">
-                <a:solidFill>
-                  <a:srgbClr val="000000"/>
-                </a:solidFill>
-                <a:latin typeface="Cascadia Mono" panose="020B0609020000020004" pitchFamily="49" charset="0"/>
-              </a:rPr>
-              <a:t>       </a:t>
-            </a:r>
-            <a:r>
-              <a:rPr lang="da-DK" sz="1400" dirty="0">
-                <a:solidFill>
-                  <a:srgbClr val="0000FF"/>
-                </a:solidFill>
-                <a:latin typeface="Cascadia Mono" panose="020B0609020000020004" pitchFamily="49" charset="0"/>
-              </a:rPr>
-              <a:t>new</a:t>
-            </a:r>
-            <a:r>
-              <a:rPr lang="da-DK" sz="1400" dirty="0">
-                <a:solidFill>
-                  <a:srgbClr val="000000"/>
-                </a:solidFill>
-                <a:latin typeface="Cascadia Mono" panose="020B0609020000020004" pitchFamily="49" charset="0"/>
-              </a:rPr>
-              <a:t> </a:t>
-            </a:r>
-            <a:r>
-              <a:rPr lang="da-DK" sz="1400" dirty="0" err="1">
-                <a:solidFill>
-                  <a:srgbClr val="000000"/>
-                </a:solidFill>
-                <a:latin typeface="Cascadia Mono" panose="020B0609020000020004" pitchFamily="49" charset="0"/>
-              </a:rPr>
-              <a:t>JsonStringEnumConverter</a:t>
-            </a:r>
-            <a:r>
-              <a:rPr lang="da-DK" sz="1400" dirty="0">
-                <a:solidFill>
-                  <a:srgbClr val="000000"/>
-                </a:solidFill>
-                <a:latin typeface="Cascadia Mono" panose="020B0609020000020004" pitchFamily="49" charset="0"/>
-              </a:rPr>
-              <a:t>(</a:t>
-            </a:r>
-            <a:r>
-              <a:rPr lang="da-DK" sz="1400" dirty="0" err="1">
-                <a:solidFill>
-                  <a:srgbClr val="000000"/>
-                </a:solidFill>
-                <a:latin typeface="Cascadia Mono" panose="020B0609020000020004" pitchFamily="49" charset="0"/>
-              </a:rPr>
-              <a:t>JsonNamingPolicy.CamelCase</a:t>
-            </a:r>
-            <a:r>
-              <a:rPr lang="da-DK" sz="1400" dirty="0" smtClean="0">
-                <a:solidFill>
-                  <a:srgbClr val="000000"/>
-                </a:solidFill>
-                <a:latin typeface="Cascadia Mono" panose="020B0609020000020004" pitchFamily="49" charset="0"/>
-              </a:rPr>
-              <a:t>)</a:t>
-            </a:r>
-          </a:p>
-          <a:p>
-            <a:r>
-              <a:rPr lang="da-DK" sz="1400" dirty="0" smtClean="0">
-                <a:solidFill>
-                  <a:srgbClr val="000000"/>
-                </a:solidFill>
-                <a:latin typeface="Cascadia Mono" panose="020B0609020000020004" pitchFamily="49" charset="0"/>
-              </a:rPr>
-              <a:t>    </a:t>
-            </a:r>
-            <a:r>
-              <a:rPr lang="da-DK" sz="1400" dirty="0">
-                <a:solidFill>
-                  <a:srgbClr val="000000"/>
-                </a:solidFill>
-                <a:latin typeface="Cascadia Mono" panose="020B0609020000020004" pitchFamily="49" charset="0"/>
-              </a:rPr>
-              <a:t>}</a:t>
-            </a:r>
-          </a:p>
-          <a:p>
-            <a:r>
-              <a:rPr lang="da-DK" sz="1400" dirty="0" smtClean="0">
-                <a:solidFill>
-                  <a:srgbClr val="000000"/>
-                </a:solidFill>
-                <a:latin typeface="Cascadia Mono" panose="020B0609020000020004" pitchFamily="49" charset="0"/>
-              </a:rPr>
               <a:t> };</a:t>
             </a:r>
+          </a:p>
+          <a:p>
             <a:endParaRPr lang="da-DK" sz="1400" dirty="0">
               <a:solidFill>
                 <a:srgbClr val="000000"/>
@@ -9224,6 +9088,78 @@
             </a:endParaRPr>
           </a:p>
           <a:p>
+            <a:r>
+              <a:rPr lang="da-DK" sz="1400" dirty="0">
+                <a:solidFill>
+                  <a:srgbClr val="000000"/>
+                </a:solidFill>
+                <a:latin typeface="Cascadia Mono" panose="020B0609020000020004" pitchFamily="49" charset="0"/>
+              </a:rPr>
+              <a:t> </a:t>
+            </a:r>
+            <a:r>
+              <a:rPr lang="da-DK" sz="1400" dirty="0" err="1">
+                <a:solidFill>
+                  <a:srgbClr val="000000"/>
+                </a:solidFill>
+                <a:latin typeface="Cascadia Mono" panose="020B0609020000020004" pitchFamily="49" charset="0"/>
+              </a:rPr>
+              <a:t>AlarmSettings</a:t>
+            </a:r>
+            <a:r>
+              <a:rPr lang="da-DK" sz="1400" dirty="0">
+                <a:solidFill>
+                  <a:srgbClr val="000000"/>
+                </a:solidFill>
+                <a:latin typeface="Cascadia Mono" panose="020B0609020000020004" pitchFamily="49" charset="0"/>
+              </a:rPr>
+              <a:t> </a:t>
+            </a:r>
+            <a:r>
+              <a:rPr lang="da-DK" sz="1400" dirty="0" err="1">
+                <a:solidFill>
+                  <a:srgbClr val="000000"/>
+                </a:solidFill>
+                <a:latin typeface="Cascadia Mono" panose="020B0609020000020004" pitchFamily="49" charset="0"/>
+              </a:rPr>
+              <a:t>alarmSettings</a:t>
+            </a:r>
+            <a:r>
+              <a:rPr lang="da-DK" sz="1400" dirty="0">
+                <a:solidFill>
+                  <a:srgbClr val="000000"/>
+                </a:solidFill>
+                <a:latin typeface="Cascadia Mono" panose="020B0609020000020004" pitchFamily="49" charset="0"/>
+              </a:rPr>
+              <a:t> = </a:t>
+            </a:r>
+            <a:r>
+              <a:rPr lang="da-DK" sz="1400" dirty="0">
+                <a:solidFill>
+                  <a:srgbClr val="0000FF"/>
+                </a:solidFill>
+                <a:latin typeface="Cascadia Mono" panose="020B0609020000020004" pitchFamily="49" charset="0"/>
+              </a:rPr>
+              <a:t>new</a:t>
+            </a:r>
+            <a:r>
+              <a:rPr lang="da-DK" sz="1400" dirty="0">
+                <a:solidFill>
+                  <a:srgbClr val="000000"/>
+                </a:solidFill>
+                <a:latin typeface="Cascadia Mono" panose="020B0609020000020004" pitchFamily="49" charset="0"/>
+              </a:rPr>
+              <a:t> </a:t>
+            </a:r>
+            <a:r>
+              <a:rPr lang="da-DK" sz="1400" dirty="0" err="1">
+                <a:solidFill>
+                  <a:srgbClr val="000000"/>
+                </a:solidFill>
+                <a:latin typeface="Cascadia Mono" panose="020B0609020000020004" pitchFamily="49" charset="0"/>
+              </a:rPr>
+              <a:t>AlarmSettings</a:t>
+            </a:r>
             <a:endParaRPr lang="da-DK" sz="1400" dirty="0">
               <a:solidFill>
                 <a:srgbClr val="000000"/>
@@ -9233,383 +9169,264 @@
           </a:p>
           <a:p>
             <a:r>
-              <a:rPr lang="da-DK" sz="1400" dirty="0" smtClean="0">
+              <a:rPr lang="da-DK" sz="1400" dirty="0">
                 <a:solidFill>
                   <a:srgbClr val="000000"/>
                 </a:solidFill>
                 <a:latin typeface="Cascadia Mono" panose="020B0609020000020004" pitchFamily="49" charset="0"/>
               </a:rPr>
+              <a:t> {</a:t>
+            </a:r>
+          </a:p>
+          <a:p>
+            <a:r>
+              <a:rPr lang="da-DK" sz="1400" dirty="0">
+                <a:solidFill>
+                  <a:srgbClr val="000000"/>
+                </a:solidFill>
+                <a:latin typeface="Cascadia Mono" panose="020B0609020000020004" pitchFamily="49" charset="0"/>
+              </a:rPr>
+              <a:t>   </a:t>
+            </a:r>
+            <a:r>
+              <a:rPr lang="da-DK" sz="1400" dirty="0" err="1">
+                <a:solidFill>
+                  <a:srgbClr val="000000"/>
+                </a:solidFill>
+                <a:latin typeface="Cascadia Mono" panose="020B0609020000020004" pitchFamily="49" charset="0"/>
+              </a:rPr>
+              <a:t>Locale</a:t>
+            </a:r>
+            <a:r>
+              <a:rPr lang="da-DK" sz="1400" dirty="0">
+                <a:solidFill>
+                  <a:srgbClr val="000000"/>
+                </a:solidFill>
+                <a:latin typeface="Cascadia Mono" panose="020B0609020000020004" pitchFamily="49" charset="0"/>
+              </a:rPr>
+              <a:t> = </a:t>
+            </a:r>
+            <a:r>
+              <a:rPr lang="da-DK" sz="1400" dirty="0">
+                <a:solidFill>
+                  <a:srgbClr val="A31515"/>
+                </a:solidFill>
+                <a:latin typeface="Cascadia Mono" panose="020B0609020000020004" pitchFamily="49" charset="0"/>
+              </a:rPr>
+              <a:t>"DK"</a:t>
+            </a:r>
+            <a:r>
+              <a:rPr lang="da-DK" sz="1400" dirty="0">
+                <a:solidFill>
+                  <a:srgbClr val="000000"/>
+                </a:solidFill>
+                <a:latin typeface="Cascadia Mono" panose="020B0609020000020004" pitchFamily="49" charset="0"/>
+              </a:rPr>
+              <a:t>,</a:t>
+            </a:r>
+          </a:p>
+          <a:p>
+            <a:r>
+              <a:rPr lang="da-DK" sz="1400" dirty="0">
+                <a:solidFill>
+                  <a:srgbClr val="000000"/>
+                </a:solidFill>
+                <a:latin typeface="Cascadia Mono" panose="020B0609020000020004" pitchFamily="49" charset="0"/>
+              </a:rPr>
+              <a:t>   </a:t>
+            </a:r>
+            <a:r>
+              <a:rPr lang="da-DK" sz="1400" dirty="0" err="1">
+                <a:solidFill>
+                  <a:srgbClr val="000000"/>
+                </a:solidFill>
+                <a:latin typeface="Cascadia Mono" panose="020B0609020000020004" pitchFamily="49" charset="0"/>
+              </a:rPr>
+              <a:t>TimeFormat</a:t>
+            </a:r>
+            <a:r>
+              <a:rPr lang="da-DK" sz="1400" dirty="0">
+                <a:solidFill>
+                  <a:srgbClr val="000000"/>
+                </a:solidFill>
+                <a:latin typeface="Cascadia Mono" panose="020B0609020000020004" pitchFamily="49" charset="0"/>
+              </a:rPr>
+              <a:t> = AlarmSettings.TimeFormatEnum.H12,</a:t>
+            </a:r>
+          </a:p>
+          <a:p>
+            <a:r>
+              <a:rPr lang="da-DK" sz="1400" dirty="0">
+                <a:solidFill>
+                  <a:srgbClr val="000000"/>
+                </a:solidFill>
+                <a:latin typeface="Cascadia Mono" panose="020B0609020000020004" pitchFamily="49" charset="0"/>
+              </a:rPr>
+              <a:t>   </a:t>
+            </a:r>
+            <a:r>
+              <a:rPr lang="da-DK" sz="1400" dirty="0" err="1">
+                <a:solidFill>
+                  <a:srgbClr val="000000"/>
+                </a:solidFill>
+                <a:latin typeface="Cascadia Mono" panose="020B0609020000020004" pitchFamily="49" charset="0"/>
+              </a:rPr>
+              <a:t>AlarmIsOn</a:t>
+            </a:r>
+            <a:r>
+              <a:rPr lang="da-DK" sz="1400" dirty="0">
+                <a:solidFill>
+                  <a:srgbClr val="000000"/>
+                </a:solidFill>
+                <a:latin typeface="Cascadia Mono" panose="020B0609020000020004" pitchFamily="49" charset="0"/>
+              </a:rPr>
+              <a:t> = </a:t>
+            </a:r>
+            <a:r>
+              <a:rPr lang="da-DK" sz="1400" dirty="0">
+                <a:solidFill>
+                  <a:srgbClr val="0000FF"/>
+                </a:solidFill>
+                <a:latin typeface="Cascadia Mono" panose="020B0609020000020004" pitchFamily="49" charset="0"/>
+              </a:rPr>
+              <a:t>false</a:t>
+            </a:r>
+            <a:r>
+              <a:rPr lang="da-DK" sz="1400" dirty="0">
+                <a:solidFill>
+                  <a:srgbClr val="000000"/>
+                </a:solidFill>
+                <a:latin typeface="Cascadia Mono" panose="020B0609020000020004" pitchFamily="49" charset="0"/>
+              </a:rPr>
+              <a:t>,</a:t>
+            </a:r>
+          </a:p>
+          <a:p>
+            <a:r>
+              <a:rPr lang="da-DK" sz="1400" dirty="0">
+                <a:solidFill>
+                  <a:srgbClr val="000000"/>
+                </a:solidFill>
+                <a:latin typeface="Cascadia Mono" panose="020B0609020000020004" pitchFamily="49" charset="0"/>
+              </a:rPr>
+              <a:t> };</a:t>
+            </a:r>
+          </a:p>
+          <a:p>
+            <a:r>
+              <a:rPr lang="da-DK" sz="1400" dirty="0">
+                <a:solidFill>
+                  <a:srgbClr val="000000"/>
+                </a:solidFill>
+                <a:latin typeface="Cascadia Mono" panose="020B0609020000020004" pitchFamily="49" charset="0"/>
+              </a:rPr>
+              <a:t>            </a:t>
+            </a:r>
+          </a:p>
+          <a:p>
+            <a:r>
+              <a:rPr lang="da-DK" sz="1400" dirty="0">
+                <a:solidFill>
+                  <a:srgbClr val="0000FF"/>
+                </a:solidFill>
+                <a:latin typeface="Cascadia Mono" panose="020B0609020000020004" pitchFamily="49" charset="0"/>
+              </a:rPr>
               <a:t> </a:t>
             </a:r>
             <a:r>
-              <a:rPr lang="da-DK" sz="1400" dirty="0" err="1" smtClean="0">
+              <a:rPr lang="da-DK" sz="1400" dirty="0" err="1">
+                <a:solidFill>
+                  <a:srgbClr val="0000FF"/>
+                </a:solidFill>
+                <a:latin typeface="Cascadia Mono" panose="020B0609020000020004" pitchFamily="49" charset="0"/>
+              </a:rPr>
+              <a:t>string</a:t>
+            </a:r>
+            <a:r>
+              <a:rPr lang="da-DK" sz="1400" dirty="0">
                 <a:solidFill>
                   <a:srgbClr val="000000"/>
                 </a:solidFill>
                 <a:latin typeface="Cascadia Mono" panose="020B0609020000020004" pitchFamily="49" charset="0"/>
               </a:rPr>
-              <a:t>AlarmSettings</a:t>
-            </a:r>
-            <a:r>
-              <a:rPr lang="da-DK" sz="1400" dirty="0" smtClean="0">
+              <a:t> </a:t>
+            </a:r>
+            <a:r>
+              <a:rPr lang="da-DK" sz="1400" dirty="0" err="1">
                 <a:solidFill>
                   <a:srgbClr val="000000"/>
                 </a:solidFill>
                 <a:latin typeface="Cascadia Mono" panose="020B0609020000020004" pitchFamily="49" charset="0"/>
               </a:rPr>
+              <a:t>filename</a:t>
+            </a:r>
+            <a:r>
+              <a:rPr lang="da-DK" sz="1400" dirty="0">
+                <a:solidFill>
+                  <a:srgbClr val="000000"/>
+                </a:solidFill>
+                <a:latin typeface="Cascadia Mono" panose="020B0609020000020004" pitchFamily="49" charset="0"/>
+              </a:rPr>
+              <a:t> = </a:t>
+            </a:r>
+            <a:r>
+              <a:rPr lang="da-DK" sz="1400" dirty="0">
+                <a:solidFill>
+                  <a:srgbClr val="A31515"/>
+                </a:solidFill>
+                <a:latin typeface="Cascadia Mono" panose="020B0609020000020004" pitchFamily="49" charset="0"/>
+              </a:rPr>
+              <a:t>"</a:t>
+            </a:r>
+            <a:r>
+              <a:rPr lang="da-DK" sz="1400" dirty="0" err="1">
+                <a:solidFill>
+                  <a:srgbClr val="A31515"/>
+                </a:solidFill>
+                <a:latin typeface="Cascadia Mono" panose="020B0609020000020004" pitchFamily="49" charset="0"/>
+              </a:rPr>
+              <a:t>settings.json</a:t>
+            </a:r>
+            <a:r>
+              <a:rPr lang="da-DK" sz="1400" dirty="0">
+                <a:solidFill>
+                  <a:srgbClr val="A31515"/>
+                </a:solidFill>
+                <a:latin typeface="Cascadia Mono" panose="020B0609020000020004" pitchFamily="49" charset="0"/>
+              </a:rPr>
+              <a:t>"</a:t>
+            </a:r>
+            <a:r>
+              <a:rPr lang="da-DK" sz="1400" dirty="0">
+                <a:solidFill>
+                  <a:srgbClr val="000000"/>
+                </a:solidFill>
+                <a:latin typeface="Cascadia Mono" panose="020B0609020000020004" pitchFamily="49" charset="0"/>
+              </a:rPr>
+              <a:t>;</a:t>
+            </a:r>
+          </a:p>
+          <a:p>
+            <a:r>
+              <a:rPr lang="da-DK" sz="1400" dirty="0">
+                <a:solidFill>
+                  <a:srgbClr val="0000FF"/>
+                </a:solidFill>
+                <a:latin typeface="Cascadia Mono" panose="020B0609020000020004" pitchFamily="49" charset="0"/>
+              </a:rPr>
               <a:t> </a:t>
             </a:r>
             <a:r>
               <a:rPr lang="da-DK" sz="1400" dirty="0" err="1">
                 <a:solidFill>
-                  <a:srgbClr val="000000"/>
+                  <a:srgbClr val="0000FF"/>
                 </a:solidFill>
                 <a:latin typeface="Cascadia Mono" panose="020B0609020000020004" pitchFamily="49" charset="0"/>
               </a:rPr>
-              <a:t>alarmSettings</a:t>
+              <a:t>string</a:t>
             </a:r>
             <a:r>
               <a:rPr lang="da-DK" sz="1400" dirty="0">
-                <a:solidFill>
-                  <a:srgbClr val="000000"/>
-                </a:solidFill>
-                <a:latin typeface="Cascadia Mono" panose="020B0609020000020004" pitchFamily="49" charset="0"/>
-              </a:rPr>
-              <a:t> = </a:t>
-            </a:r>
-            <a:r>
-              <a:rPr lang="da-DK" sz="1400" dirty="0">
-                <a:solidFill>
-                  <a:srgbClr val="0000FF"/>
-                </a:solidFill>
-                <a:latin typeface="Cascadia Mono" panose="020B0609020000020004" pitchFamily="49" charset="0"/>
-              </a:rPr>
-              <a:t>new</a:t>
-            </a:r>
-            <a:r>
-              <a:rPr lang="da-DK" sz="1400" dirty="0">
-                <a:solidFill>
-                  <a:srgbClr val="000000"/>
-                </a:solidFill>
-                <a:latin typeface="Cascadia Mono" panose="020B0609020000020004" pitchFamily="49" charset="0"/>
-              </a:rPr>
-              <a:t> </a:t>
-            </a:r>
-            <a:r>
-              <a:rPr lang="da-DK" sz="1400" dirty="0" err="1">
-                <a:solidFill>
-                  <a:srgbClr val="000000"/>
-                </a:solidFill>
-                <a:latin typeface="Cascadia Mono" panose="020B0609020000020004" pitchFamily="49" charset="0"/>
-              </a:rPr>
-              <a:t>AlarmSettings</a:t>
-            </a:r>
-            <a:endParaRPr lang="da-DK" sz="1400" dirty="0">
-              <a:solidFill>
-                <a:srgbClr val="000000"/>
-              </a:solidFill>
-              <a:latin typeface="Cascadia Mono" panose="020B0609020000020004" pitchFamily="49" charset="0"/>
-            </a:endParaRPr>
-          </a:p>
-          <a:p>
-            <a:r>
-              <a:rPr lang="da-DK" sz="1400" dirty="0" smtClean="0">
-                <a:solidFill>
-                  <a:srgbClr val="000000"/>
-                </a:solidFill>
-                <a:latin typeface="Cascadia Mono" panose="020B0609020000020004" pitchFamily="49" charset="0"/>
-              </a:rPr>
-              <a:t> {</a:t>
-            </a:r>
-            <a:endParaRPr lang="da-DK" sz="1400" dirty="0">
-              <a:solidFill>
-                <a:srgbClr val="000000"/>
-              </a:solidFill>
-              <a:latin typeface="Cascadia Mono" panose="020B0609020000020004" pitchFamily="49" charset="0"/>
-            </a:endParaRPr>
-          </a:p>
-          <a:p>
-            <a:r>
-              <a:rPr lang="da-DK" sz="1400" dirty="0" smtClean="0">
-                <a:solidFill>
-                  <a:srgbClr val="000000"/>
-                </a:solidFill>
-                <a:latin typeface="Cascadia Mono" panose="020B0609020000020004" pitchFamily="49" charset="0"/>
-              </a:rPr>
-              <a:t>   </a:t>
-            </a:r>
-            <a:r>
-              <a:rPr lang="da-DK" sz="1400" dirty="0" err="1" smtClean="0">
-                <a:solidFill>
-                  <a:srgbClr val="000000"/>
-                </a:solidFill>
-                <a:latin typeface="Cascadia Mono" panose="020B0609020000020004" pitchFamily="49" charset="0"/>
-              </a:rPr>
-              <a:t>Locale</a:t>
-            </a:r>
-            <a:r>
-              <a:rPr lang="da-DK" sz="1400" dirty="0" smtClean="0">
-                <a:solidFill>
-                  <a:srgbClr val="000000"/>
-                </a:solidFill>
-                <a:latin typeface="Cascadia Mono" panose="020B0609020000020004" pitchFamily="49" charset="0"/>
-              </a:rPr>
-              <a:t> </a:t>
-            </a:r>
-            <a:r>
-              <a:rPr lang="da-DK" sz="1400" dirty="0">
-                <a:solidFill>
-                  <a:srgbClr val="000000"/>
-                </a:solidFill>
-                <a:latin typeface="Cascadia Mono" panose="020B0609020000020004" pitchFamily="49" charset="0"/>
-              </a:rPr>
-              <a:t>= </a:t>
-            </a:r>
-            <a:r>
-              <a:rPr lang="da-DK" sz="1400" dirty="0">
-                <a:solidFill>
-                  <a:srgbClr val="A31515"/>
-                </a:solidFill>
-                <a:latin typeface="Cascadia Mono" panose="020B0609020000020004" pitchFamily="49" charset="0"/>
-              </a:rPr>
-              <a:t>"DK"</a:t>
-            </a:r>
-            <a:r>
-              <a:rPr lang="da-DK" sz="1400" dirty="0">
-                <a:solidFill>
-                  <a:srgbClr val="000000"/>
-                </a:solidFill>
-                <a:latin typeface="Cascadia Mono" panose="020B0609020000020004" pitchFamily="49" charset="0"/>
-              </a:rPr>
-              <a:t>,</a:t>
-            </a:r>
-          </a:p>
-          <a:p>
-            <a:r>
-              <a:rPr lang="da-DK" sz="1400" dirty="0" smtClean="0">
-                <a:solidFill>
-                  <a:srgbClr val="000000"/>
-                </a:solidFill>
-                <a:latin typeface="Cascadia Mono" panose="020B0609020000020004" pitchFamily="49" charset="0"/>
-              </a:rPr>
-              <a:t>   </a:t>
-            </a:r>
-            <a:r>
-              <a:rPr lang="da-DK" sz="1400" dirty="0" err="1" smtClean="0">
-                <a:solidFill>
-                  <a:srgbClr val="000000"/>
-                </a:solidFill>
-                <a:latin typeface="Cascadia Mono" panose="020B0609020000020004" pitchFamily="49" charset="0"/>
-              </a:rPr>
-              <a:t>TimeFormat</a:t>
-            </a:r>
-            <a:r>
-              <a:rPr lang="da-DK" sz="1400" dirty="0" smtClean="0">
-                <a:solidFill>
-                  <a:srgbClr val="000000"/>
-                </a:solidFill>
-                <a:latin typeface="Cascadia Mono" panose="020B0609020000020004" pitchFamily="49" charset="0"/>
-              </a:rPr>
-              <a:t> </a:t>
-            </a:r>
-            <a:r>
-              <a:rPr lang="da-DK" sz="1400" dirty="0">
-                <a:solidFill>
-                  <a:srgbClr val="000000"/>
-                </a:solidFill>
-                <a:latin typeface="Cascadia Mono" panose="020B0609020000020004" pitchFamily="49" charset="0"/>
-              </a:rPr>
-              <a:t>= AlarmSettings.TimeFormatEnum.H12,</a:t>
-            </a:r>
-          </a:p>
-          <a:p>
-            <a:r>
-              <a:rPr lang="da-DK" sz="1400" dirty="0" smtClean="0">
-                <a:solidFill>
-                  <a:srgbClr val="000000"/>
-                </a:solidFill>
-                <a:latin typeface="Cascadia Mono" panose="020B0609020000020004" pitchFamily="49" charset="0"/>
-              </a:rPr>
-              <a:t>   </a:t>
-            </a:r>
-            <a:r>
-              <a:rPr lang="da-DK" sz="1400" dirty="0" err="1" smtClean="0">
-                <a:solidFill>
-                  <a:srgbClr val="000000"/>
-                </a:solidFill>
-                <a:latin typeface="Cascadia Mono" panose="020B0609020000020004" pitchFamily="49" charset="0"/>
-              </a:rPr>
-              <a:t>AlarmIsOn</a:t>
-            </a:r>
-            <a:r>
-              <a:rPr lang="da-DK" sz="1400" dirty="0" smtClean="0">
-                <a:solidFill>
-                  <a:srgbClr val="000000"/>
-                </a:solidFill>
-                <a:latin typeface="Cascadia Mono" panose="020B0609020000020004" pitchFamily="49" charset="0"/>
-              </a:rPr>
-              <a:t> </a:t>
-            </a:r>
-            <a:r>
-              <a:rPr lang="da-DK" sz="1400" dirty="0">
-                <a:solidFill>
-                  <a:srgbClr val="000000"/>
-                </a:solidFill>
-                <a:latin typeface="Cascadia Mono" panose="020B0609020000020004" pitchFamily="49" charset="0"/>
-              </a:rPr>
-              <a:t>= </a:t>
-            </a:r>
-            <a:r>
-              <a:rPr lang="da-DK" sz="1400" dirty="0">
-                <a:solidFill>
-                  <a:srgbClr val="0000FF"/>
-                </a:solidFill>
-                <a:latin typeface="Cascadia Mono" panose="020B0609020000020004" pitchFamily="49" charset="0"/>
-              </a:rPr>
-              <a:t>false</a:t>
-            </a:r>
-            <a:r>
-              <a:rPr lang="da-DK" sz="1400" dirty="0">
-                <a:solidFill>
-                  <a:srgbClr val="000000"/>
-                </a:solidFill>
-                <a:latin typeface="Cascadia Mono" panose="020B0609020000020004" pitchFamily="49" charset="0"/>
-              </a:rPr>
-              <a:t>,</a:t>
-            </a:r>
-          </a:p>
-          <a:p>
-            <a:r>
-              <a:rPr lang="da-DK" sz="1400" dirty="0" smtClean="0">
-                <a:solidFill>
-                  <a:srgbClr val="000000"/>
-                </a:solidFill>
-                <a:latin typeface="Cascadia Mono" panose="020B0609020000020004" pitchFamily="49" charset="0"/>
-              </a:rPr>
-              <a:t> };</a:t>
-            </a:r>
-            <a:endParaRPr lang="da-DK" sz="1400" dirty="0">
-              <a:solidFill>
-                <a:srgbClr val="000000"/>
-              </a:solidFill>
-              <a:latin typeface="Cascadia Mono" panose="020B0609020000020004" pitchFamily="49" charset="0"/>
-            </a:endParaRPr>
-          </a:p>
-          <a:p>
-            <a:r>
-              <a:rPr lang="da-DK" sz="1400" dirty="0">
-                <a:solidFill>
-                  <a:srgbClr val="000000"/>
-                </a:solidFill>
-                <a:latin typeface="Cascadia Mono" panose="020B0609020000020004" pitchFamily="49" charset="0"/>
-              </a:rPr>
-              <a:t>            </a:t>
-            </a:r>
-          </a:p>
-          <a:p>
-            <a:r>
-              <a:rPr lang="da-DK" sz="1400" dirty="0" smtClean="0">
-                <a:solidFill>
-                  <a:srgbClr val="0000FF"/>
-                </a:solidFill>
-                <a:latin typeface="Cascadia Mono" panose="020B0609020000020004" pitchFamily="49" charset="0"/>
-              </a:rPr>
-              <a:t> </a:t>
-            </a:r>
-            <a:r>
-              <a:rPr lang="da-DK" sz="1400" dirty="0" err="1" smtClean="0">
-                <a:solidFill>
-                  <a:srgbClr val="0000FF"/>
-                </a:solidFill>
-                <a:latin typeface="Cascadia Mono" panose="020B0609020000020004" pitchFamily="49" charset="0"/>
-              </a:rPr>
-              <a:t>string</a:t>
-            </a:r>
-            <a:r>
-              <a:rPr lang="da-DK" sz="1400" dirty="0" smtClean="0">
-                <a:solidFill>
-                  <a:srgbClr val="000000"/>
-                </a:solidFill>
-                <a:latin typeface="Cascadia Mono" panose="020B0609020000020004" pitchFamily="49" charset="0"/>
-              </a:rPr>
-              <a:t> </a:t>
-            </a:r>
-            <a:r>
-              <a:rPr lang="da-DK" sz="1400" dirty="0" err="1">
-                <a:solidFill>
-                  <a:srgbClr val="000000"/>
-                </a:solidFill>
-                <a:latin typeface="Cascadia Mono" panose="020B0609020000020004" pitchFamily="49" charset="0"/>
-              </a:rPr>
-              <a:t>filename</a:t>
-            </a:r>
-            <a:r>
-              <a:rPr lang="da-DK" sz="1400" dirty="0">
-                <a:solidFill>
-                  <a:srgbClr val="000000"/>
-                </a:solidFill>
-                <a:latin typeface="Cascadia Mono" panose="020B0609020000020004" pitchFamily="49" charset="0"/>
-              </a:rPr>
-              <a:t> = </a:t>
-            </a:r>
-            <a:r>
-              <a:rPr lang="da-DK" sz="1400" dirty="0">
-                <a:solidFill>
-                  <a:srgbClr val="A31515"/>
-                </a:solidFill>
-                <a:latin typeface="Cascadia Mono" panose="020B0609020000020004" pitchFamily="49" charset="0"/>
-              </a:rPr>
-              <a:t>"</a:t>
-            </a:r>
-            <a:r>
-              <a:rPr lang="da-DK" sz="1400" dirty="0" err="1">
-                <a:solidFill>
-                  <a:srgbClr val="A31515"/>
-                </a:solidFill>
-                <a:latin typeface="Cascadia Mono" panose="020B0609020000020004" pitchFamily="49" charset="0"/>
-              </a:rPr>
-              <a:t>settings.json</a:t>
-            </a:r>
-            <a:r>
-              <a:rPr lang="da-DK" sz="1400" dirty="0">
-                <a:solidFill>
-                  <a:srgbClr val="A31515"/>
-                </a:solidFill>
-                <a:latin typeface="Cascadia Mono" panose="020B0609020000020004" pitchFamily="49" charset="0"/>
-              </a:rPr>
-              <a:t>"</a:t>
-            </a:r>
-            <a:r>
-              <a:rPr lang="da-DK" sz="1400" dirty="0">
-                <a:solidFill>
-                  <a:srgbClr val="000000"/>
-                </a:solidFill>
-                <a:latin typeface="Cascadia Mono" panose="020B0609020000020004" pitchFamily="49" charset="0"/>
-              </a:rPr>
-              <a:t>;</a:t>
-            </a:r>
-          </a:p>
-          <a:p>
-            <a:r>
-              <a:rPr lang="da-DK" sz="1400" dirty="0" smtClean="0">
-                <a:solidFill>
-                  <a:srgbClr val="0000FF"/>
-                </a:solidFill>
-                <a:latin typeface="Cascadia Mono" panose="020B0609020000020004" pitchFamily="49" charset="0"/>
-              </a:rPr>
-              <a:t> </a:t>
-            </a:r>
-            <a:r>
-              <a:rPr lang="da-DK" sz="1400" dirty="0" err="1" smtClean="0">
-                <a:solidFill>
-                  <a:srgbClr val="0000FF"/>
-                </a:solidFill>
-                <a:latin typeface="Cascadia Mono" panose="020B0609020000020004" pitchFamily="49" charset="0"/>
-              </a:rPr>
-              <a:t>string</a:t>
-            </a:r>
-            <a:r>
-              <a:rPr lang="da-DK" sz="1400" dirty="0" smtClean="0">
                 <a:solidFill>
                   <a:srgbClr val="000000"/>
                 </a:solidFill>
@@ -9705,7 +9522,7 @@
               <a:rPr lang="da-DK" sz="2800" dirty="0" err="1">
                 <a:latin typeface="Gill Sans MT" panose="020B0502020104020203" pitchFamily="34" charset="0"/>
               </a:rPr>
-              <a:t>Attributes</a:t>
+              <a:t>JsonSerializerOptions</a:t>
             </a:r>
             <a:r>
               <a:rPr lang="da-DK" sz="2800" dirty="0">
@@ -9753,7 +9570,7 @@
               <a:rPr lang="da-DK" sz="2800" dirty="0" err="1">
                 <a:latin typeface="Gill Sans MT" panose="020B0502020104020203" pitchFamily="34" charset="0"/>
               </a:rPr>
-              <a:t>change</a:t>
+              <a:t>make</a:t>
             </a:r>
             <a:r>
               <a:rPr lang="da-DK" sz="2800" dirty="0">
@@ -9771,37 +9588,98 @@
               <a:rPr lang="da-DK" sz="2800" dirty="0">
                 <a:latin typeface="Gill Sans MT" panose="020B0502020104020203" pitchFamily="34" charset="0"/>
               </a:rPr>
-              <a:t> element </a:t>
+              <a:t> have </a:t>
             </a:r>
             <a:r>
               <a:rPr lang="da-DK" sz="2800" dirty="0" err="1">
                 <a:latin typeface="Gill Sans MT" panose="020B0502020104020203" pitchFamily="34" charset="0"/>
               </a:rPr>
-              <a:t>name</a:t>
+              <a:t>readable</a:t>
             </a:r>
             <a:r>
               <a:rPr lang="da-DK" sz="2800" dirty="0">
                 <a:latin typeface="Gill Sans MT" panose="020B0502020104020203" pitchFamily="34" charset="0"/>
               </a:rPr>
-              <a:t> or </a:t>
+              <a:t> </a:t>
             </a:r>
             <a:r>
               <a:rPr lang="da-DK" sz="2800" dirty="0" err="1">
                 <a:latin typeface="Gill Sans MT" panose="020B0502020104020203" pitchFamily="34" charset="0"/>
               </a:rPr>
-              <a:t>ignore</a:t>
+              <a:t>enums</a:t>
             </a:r>
             <a:r>
               <a:rPr lang="da-DK" sz="2800" dirty="0">
                 <a:latin typeface="Gill Sans MT" panose="020B0502020104020203" pitchFamily="34" charset="0"/>
               </a:rPr>
-              <a:t> a class </a:t>
+              <a:t>.</a:t>
+            </a:r>
+          </a:p>
+          <a:p>
+            <a:endParaRPr lang="da-DK" sz="2800" dirty="0">
+              <a:latin typeface="Gill Sans MT" panose="020B0502020104020203" pitchFamily="34" charset="0"/>
+            </a:endParaRPr>
+          </a:p>
+          <a:p>
+            <a:r>
+              <a:rPr lang="da-DK" sz="2800" dirty="0">
+                <a:latin typeface="Gill Sans MT" panose="020B0502020104020203" pitchFamily="34" charset="0"/>
+              </a:rPr>
+              <a:t>It </a:t>
             </a:r>
             <a:r>
               <a:rPr lang="da-DK" sz="2800" dirty="0" err="1">
                 <a:latin typeface="Gill Sans MT" panose="020B0502020104020203" pitchFamily="34" charset="0"/>
               </a:rPr>
-              <a:t>field</a:t>
+              <a:t>can</a:t>
+            </a:r>
+            <a:r>
+              <a:rPr lang="da-DK" sz="2800" dirty="0">
+                <a:latin typeface="Gill Sans MT" panose="020B0502020104020203" pitchFamily="34" charset="0"/>
+              </a:rPr>
+              <a:t> </a:t>
+            </a:r>
+            <a:r>
+              <a:rPr lang="da-DK" sz="2800" dirty="0" err="1">
+                <a:latin typeface="Gill Sans MT" panose="020B0502020104020203" pitchFamily="34" charset="0"/>
+              </a:rPr>
+              <a:t>also</a:t>
+            </a:r>
+            <a:r>
+              <a:rPr lang="da-DK" sz="2800" dirty="0">
+                <a:latin typeface="Gill Sans MT" panose="020B0502020104020203" pitchFamily="34" charset="0"/>
+              </a:rPr>
+              <a:t> </a:t>
+            </a:r>
+            <a:r>
+              <a:rPr lang="da-DK" sz="2800" dirty="0" err="1">
+                <a:latin typeface="Gill Sans MT" panose="020B0502020104020203" pitchFamily="34" charset="0"/>
+              </a:rPr>
+              <a:t>change</a:t>
+            </a:r>
+            <a:r>
+              <a:rPr lang="da-DK" sz="2800" dirty="0">
+                <a:latin typeface="Gill Sans MT" panose="020B0502020104020203" pitchFamily="34" charset="0"/>
+              </a:rPr>
+              <a:t> the </a:t>
+            </a:r>
+            <a:r>
+              <a:rPr lang="da-DK" sz="2800" dirty="0" err="1">
+                <a:latin typeface="Gill Sans MT" panose="020B0502020104020203" pitchFamily="34" charset="0"/>
+              </a:rPr>
+              <a:t>casing</a:t>
+            </a:r>
+            <a:r>
+              <a:rPr lang="da-DK" sz="2800" dirty="0">
+                <a:latin typeface="Gill Sans MT" panose="020B0502020104020203" pitchFamily="34" charset="0"/>
+              </a:rPr>
+              <a:t> </a:t>
+            </a:r>
+            <a:r>
+              <a:rPr lang="da-DK" sz="2800" dirty="0" err="1">
+                <a:latin typeface="Gill Sans MT" panose="020B0502020104020203" pitchFamily="34" charset="0"/>
+              </a:rPr>
+              <a:t>used</a:t>
             </a:r>
             <a:r>
               <a:rPr lang="da-DK" sz="2800" dirty="0">
@@ -9838,14 +9716,7 @@
                 <a:latin typeface="Gill Sans MT" panose="020B0502020104020203" pitchFamily="34" charset="0"/>
                 <a:hlinkClick r:id="rId3"/>
               </a:rPr>
-              <a:t>https://</a:t>
-            </a:r>
-            <a:r>
-              <a:rPr lang="da-DK" sz="1200" dirty="0" smtClean="0">
-                <a:latin typeface="Gill Sans MT" panose="020B0502020104020203" pitchFamily="34" charset="0"/>
-                <a:hlinkClick r:id="rId3"/>
-              </a:rPr>
-              <a:t>learn.microsoft.com/en-us/dotnet/standard/serialization/system-text-json/customize-properties?pivots=dotnet-6-0</a:t>
+              <a:t>https://learn.microsoft.com/en-us/dotnet/standard/serialization/system-text-json/customize-properties?pivots=dotnet-6-0</a:t>
             </a:r>
             <a:endParaRPr lang="da-DK" sz="1200" dirty="0">
               <a:latin typeface="Gill Sans MT" panose="020B0502020104020203" pitchFamily="34" charset="0"/>
@@ -9867,8 +9738,8 @@
         </p:nvSpPr>
         <p:spPr>
           <a:xfrm>
-            <a:off x="7670800" y="3695699"/>
-            <a:ext cx="4017836" cy="2571885"/>
+            <a:off x="7670800" y="4124812"/>
+            <a:ext cx="4017836" cy="2142772"/>
           </a:xfrm>
           <a:prstGeom prst="rect">
             <a:avLst/>
@@ -9989,12 +9860,6 @@
               </a:rPr>
               <a:t>  }</a:t>
             </a:r>
-            <a:endParaRPr lang="en-US" sz="1400" dirty="0">
-              <a:solidFill>
-                <a:schemeClr val="tx1"/>
-              </a:solidFill>
-              <a:latin typeface="Consolas" panose="020B0609020204030204" pitchFamily="49" charset="0"/>
-            </a:endParaRPr>
           </a:p>
         </p:txBody>
       </p:sp>
@@ -10008,13 +9873,6 @@
   <p:clrMapOvr>
     <a:masterClrMapping/>
   </p:clrMapOvr>
-  <p:timing>
-    <p:tnLst>
-      <p:par>
-        <p:cTn id="1" dur="indefinite" restart="never" nodeType="tmRoot"/>
-      </p:par>
-    </p:tnLst>
-  </p:timing>
 </p:sld>
 </file>
 
@@ -10387,13 +10245,6 @@
   <p:clrMapOvr>
     <a:masterClrMapping/>
   </p:clrMapOvr>
-  <p:timing>
-    <p:tnLst>
-      <p:par>
-        <p:cTn id="1" dur="indefinite" restart="never" nodeType="tmRoot"/>
-      </p:par>
-    </p:tnLst>
-  </p:timing>
 </p:sld>
 </file>
 
@@ -10466,13 +10317,6 @@
   <p:clrMapOvr>
     <a:masterClrMapping/>
   </p:clrMapOvr>
-  <p:timing>
-    <p:tnLst>
-      <p:par>
-        <p:cTn id="1" dur="indefinite" restart="never" nodeType="tmRoot"/>
-      </p:par>
-    </p:tnLst>
-  </p:timing>
 </p:sld>
 </file>
 
@@ -11168,13 +11012,6 @@
   <p:clrMapOvr>
     <a:masterClrMapping/>
   </p:clrMapOvr>
-  <p:timing>
-    <p:tnLst>
-      <p:par>
-        <p:cTn id="1" dur="indefinite" restart="never" nodeType="tmRoot"/>
-      </p:par>
-    </p:tnLst>
-  </p:timing>
 </p:sld>
 </file>
 
@@ -11906,13 +11743,6 @@
   <p:clrMapOvr>
     <a:masterClrMapping/>
   </p:clrMapOvr>
-  <p:timing>
-    <p:tnLst>
-      <p:par>
-        <p:cTn id="1" dur="indefinite" restart="never" nodeType="tmRoot"/>
-      </p:par>
-    </p:tnLst>
-  </p:timing>
 </p:sld>
 </file>
 
@@ -12899,13 +12729,6 @@
   <p:clrMapOvr>
     <a:masterClrMapping/>
   </p:clrMapOvr>
-  <p:timing>
-    <p:tnLst>
-      <p:par>
-        <p:cTn id="1" dur="indefinite" restart="never" nodeType="tmRoot"/>
-      </p:par>
-    </p:tnLst>
-  </p:timing>
 </p:sld>
 </file>
 
@@ -13070,13 +12893,6 @@
   <p:clrMapOvr>
     <a:masterClrMapping/>
   </p:clrMapOvr>
-  <p:timing>
-    <p:tnLst>
-      <p:par>
-        <p:cTn id="1" dur="indefinite" restart="never" nodeType="tmRoot"/>
-      </p:par>
-    </p:tnLst>
-  </p:timing>
 </p:sld>
 </file>
 
@@ -13557,13 +13373,6 @@
   <p:clrMapOvr>
     <a:masterClrMapping/>
   </p:clrMapOvr>
-  <p:timing>
-    <p:tnLst>
-      <p:par>
-        <p:cTn id="1" dur="indefinite" restart="never" nodeType="tmRoot"/>
-      </p:par>
-    </p:tnLst>
-  </p:timing>
 </p:sld>
 </file>
 
@@ -13839,13 +13648,6 @@
   <p:clrMapOvr>
     <a:masterClrMapping/>
   </p:clrMapOvr>
-  <p:timing>
-    <p:tnLst>
-      <p:par>
-        <p:cTn id="1" dur="indefinite" restart="never" nodeType="tmRoot"/>
-      </p:par>
-    </p:tnLst>
-  </p:timing>
 </p:sld>
 </file>
 
@@ -13943,13 +13745,6 @@
   <p:clrMapOvr>
     <a:masterClrMapping/>
   </p:clrMapOvr>
-  <p:timing>
-    <p:tnLst>
-      <p:par>
-        <p:cTn id="1" dur="indefinite" restart="never" nodeType="tmRoot"/>
-      </p:par>
-    </p:tnLst>
-  </p:timing>
 </p:sld>
 </file>
 
@@ -17122,13 +16917,6 @@
   <p:clrMapOvr>
     <a:masterClrMapping/>
   </p:clrMapOvr>
-  <p:timing>
-    <p:tnLst>
-      <p:par>
-        <p:cTn id="1" dur="indefinite" restart="never" nodeType="tmRoot"/>
-      </p:par>
-    </p:tnLst>
-  </p:timing>
 </p:sld>
 </file>
 
@@ -17216,12 +17004,8 @@
           <a:lstStyle/>
           <a:p>
             <a:r>
-              <a:rPr lang="en-US" dirty="0" smtClean="0"/>
-              <a:t>Configuration </a:t>
-            </a:r>
-            <a:r>
               <a:rPr lang="en-US" dirty="0"/>
-              <a:t>– an example</a:t>
+              <a:t>Configuration – an example</a:t>
             </a:r>
             <a:endParaRPr lang="en-US" sz="1800" dirty="0"/>
           </a:p>
@@ -17260,11 +17044,7 @@
             </a:r>
             <a:r>
               <a:rPr lang="en-US" sz="2000" dirty="0"/>
-              <a:t> by 5 individual </a:t>
-            </a:r>
-            <a:r>
-              <a:rPr lang="en-US" sz="2000" dirty="0" smtClean="0"/>
-              <a:t>files</a:t>
+              <a:t> by 5 individual files</a:t>
             </a:r>
             <a:endParaRPr lang="en-US" sz="1800" dirty="0"/>
           </a:p>
@@ -18818,13 +18598,6 @@
   <p:clrMapOvr>
     <a:masterClrMapping/>
   </p:clrMapOvr>
-  <p:timing>
-    <p:tnLst>
-      <p:par>
-        <p:cTn id="1" dur="indefinite" restart="never" nodeType="tmRoot"/>
-      </p:par>
-    </p:tnLst>
-  </p:timing>
 </p:sld>
 </file>
 
@@ -18914,13 +18687,6 @@
   <p:clrMapOvr>
     <a:masterClrMapping/>
   </p:clrMapOvr>
-  <p:timing>
-    <p:tnLst>
-      <p:par>
-        <p:cTn id="1" dur="indefinite" restart="never" nodeType="tmRoot"/>
-      </p:par>
-    </p:tnLst>
-  </p:timing>
 </p:sld>
 </file>
 
@@ -19341,13 +19107,6 @@
   <p:clrMapOvr>
     <a:masterClrMapping/>
   </p:clrMapOvr>
-  <p:timing>
-    <p:tnLst>
-      <p:par>
-        <p:cTn id="1" dur="indefinite" restart="never" nodeType="tmRoot"/>
-      </p:par>
-    </p:tnLst>
-  </p:timing>
 </p:sld>
 </file>
 
@@ -20533,13 +20292,6 @@
   <p:clrMapOvr>
     <a:masterClrMapping/>
   </p:clrMapOvr>
-  <p:timing>
-    <p:tnLst>
-      <p:par>
-        <p:cTn id="1" dur="indefinite" restart="never" nodeType="tmRoot"/>
-      </p:par>
-    </p:tnLst>
-  </p:timing>
 </p:sld>
 </file>
 
@@ -20612,13 +20364,6 @@
   <p:clrMapOvr>
     <a:masterClrMapping/>
   </p:clrMapOvr>
-  <p:timing>
-    <p:tnLst>
-      <p:par>
-        <p:cTn id="1" dur="indefinite" restart="never" nodeType="tmRoot"/>
-      </p:par>
-    </p:tnLst>
-  </p:timing>
 </p:sld>
 </file>
 
@@ -20728,16 +20473,6 @@
               </a:rPr>
               <a:t>AlarmSettings</a:t>
             </a:r>
-            <a:r>
-              <a:rPr lang="en-GB" dirty="0">
-                <a:solidFill>
-                  <a:schemeClr val="tx1"/>
-                </a:solidFill>
-                <a:latin typeface="Consolas" panose="020B0609020204030204" pitchFamily="49" charset="0"/>
-                <a:cs typeface="Consolas" panose="020B0609020204030204" pitchFamily="49" charset="0"/>
-              </a:rPr>
-              <a:t/>
-            </a:r>
             <a:br>
               <a:rPr lang="en-GB" dirty="0">
                 <a:solidFill>
@@ -20806,16 +20541,6 @@
               </a:rPr>
               <a:t>TimeFormatEnum</a:t>
             </a:r>
-            <a:r>
-              <a:rPr lang="en-GB" dirty="0">
-                <a:solidFill>
-                  <a:schemeClr val="tx1"/>
-                </a:solidFill>
-                <a:latin typeface="Consolas" panose="020B0609020204030204" pitchFamily="49" charset="0"/>
-                <a:cs typeface="Consolas" panose="020B0609020204030204" pitchFamily="49" charset="0"/>
-              </a:rPr>
-              <a:t/>
-            </a:r>
             <a:br>
               <a:rPr lang="en-GB" dirty="0">
                 <a:solidFill>
@@ -20914,16 +20639,6 @@
             </a:r>
           </a:p>
           <a:p>
-            <a:r>
-              <a:rPr lang="en-GB" dirty="0">
-                <a:solidFill>
-                  <a:schemeClr val="tx1"/>
-                </a:solidFill>
-                <a:latin typeface="Consolas" panose="020B0609020204030204" pitchFamily="49" charset="0"/>
-                <a:cs typeface="Consolas" panose="020B0609020204030204" pitchFamily="49" charset="0"/>
-              </a:rPr>
-              <a:t/>
-            </a:r>
             <a:br>
               <a:rPr lang="en-GB" dirty="0">
                 <a:solidFill>
@@ -21222,19 +20937,19 @@
           <a:lstStyle/>
           <a:p>
             <a:r>
-              <a:rPr lang="da-DK" sz="2800" dirty="0" smtClean="0">
+              <a:rPr lang="da-DK" sz="2800" dirty="0">
                 <a:latin typeface="Gill Sans MT" panose="020B0502020104020203" pitchFamily="34" charset="0"/>
               </a:rPr>
               <a:t>The </a:t>
             </a:r>
             <a:r>
-              <a:rPr lang="da-DK" sz="2800" dirty="0" err="1" smtClean="0">
+              <a:rPr lang="da-DK" sz="2800" dirty="0" err="1">
                 <a:latin typeface="Gill Sans MT" panose="020B0502020104020203" pitchFamily="34" charset="0"/>
               </a:rPr>
               <a:t>JsonSerializer</a:t>
             </a:r>
             <a:r>
-              <a:rPr lang="da-DK" sz="2800" dirty="0" smtClean="0">
+              <a:rPr lang="da-DK" sz="2800" dirty="0">
                 <a:latin typeface="Gill Sans MT" panose="020B0502020104020203" pitchFamily="34" charset="0"/>
               </a:rPr>
               <a:t> </a:t>
@@ -21470,13 +21185,6 @@
   <p:clrMapOvr>
     <a:masterClrMapping/>
   </p:clrMapOvr>
-  <p:timing>
-    <p:tnLst>
-      <p:par>
-        <p:cTn id="1" dur="indefinite" restart="never" nodeType="tmRoot"/>
-      </p:par>
-    </p:tnLst>
-  </p:timing>
 </p:sld>
 </file>
 
@@ -22017,6 +21725,15 @@
 </file>
 
 <file path=customXml/item1.xml><?xml version="1.0" encoding="utf-8"?>
+<?mso-contentType ?>
+<FormTemplates xmlns="http://schemas.microsoft.com/sharepoint/v3/contenttype/forms">
+  <Display>DocumentLibraryForm</Display>
+  <Edit>DocumentLibraryForm</Edit>
+  <New>DocumentLibraryForm</New>
+</FormTemplates>
+</file>
+
+<file path=customXml/item2.xml><?xml version="1.0" encoding="utf-8"?>
 <ct:contentTypeSchema xmlns:ct="http://schemas.microsoft.com/office/2006/metadata/contentType" xmlns:ma="http://schemas.microsoft.com/office/2006/metadata/properties/metaAttributes" ct:_="" ma:_="" ma:contentTypeName="Dokument" ma:contentTypeID="0x01010056836BC33D1E5846BD77C269C61838DB" ma:contentTypeVersion="17" ma:contentTypeDescription="Opret et nyt dokument." ma:contentTypeScope="" ma:versionID="c7a7960aa9cabac888865345eee70e88">
   <xsd:schema xmlns:xsd="http://www.w3.org/2001/XMLSchema" xmlns:xs="http://www.w3.org/2001/XMLSchema" xmlns:p="http://schemas.microsoft.com/office/2006/metadata/properties" xmlns:ns3="f659a008-7c21-4ee3-a745-e38581e13101" xmlns:ns4="e064323b-8959-406a-a3e9-bb6e93638192" targetNamespace="http://schemas.microsoft.com/office/2006/metadata/properties" ma:root="true" ma:fieldsID="f9c7cf85a0d1b0fe91c21a710a1f72dc" ns3:_="" ns4:_="">
     <xsd:import namespace="f659a008-7c21-4ee3-a745-e38581e13101"/>
@@ -22263,15 +21980,6 @@
 </ct:contentTypeSchema>
 </file>
 
-<file path=customXml/item2.xml><?xml version="1.0" encoding="utf-8"?>
-<?mso-contentType ?>
-<FormTemplates xmlns="http://schemas.microsoft.com/sharepoint/v3/contenttype/forms">
-  <Display>DocumentLibraryForm</Display>
-  <Edit>DocumentLibraryForm</Edit>
-  <New>DocumentLibraryForm</New>
-</FormTemplates>
-</file>
-
 <file path=customXml/item3.xml><?xml version="1.0" encoding="utf-8"?>
 <p:properties xmlns:p="http://schemas.microsoft.com/office/2006/metadata/properties" xmlns:xsi="http://www.w3.org/2001/XMLSchema-instance" xmlns:pc="http://schemas.microsoft.com/office/infopath/2007/PartnerControls">
   <documentManagement>
@@ -22281,6 +21989,14 @@
 </file>
 
 <file path=customXml/itemProps1.xml><?xml version="1.0" encoding="utf-8"?>
+<ds:datastoreItem xmlns:ds="http://schemas.openxmlformats.org/officeDocument/2006/customXml" ds:itemID="{AE1F6106-C022-4D28-91C5-A026916BD284}">
+  <ds:schemaRefs>
+    <ds:schemaRef ds:uri="http://schemas.microsoft.com/sharepoint/v3/contenttype/forms"/>
+  </ds:schemaRefs>
+</ds:datastoreItem>
+</file>
+
+<file path=customXml/itemProps2.xml><?xml version="1.0" encoding="utf-8"?>
 <ds:datastoreItem xmlns:ds="http://schemas.openxmlformats.org/officeDocument/2006/customXml" ds:itemID="{DF923E47-01FF-4E6D-83EE-B5ECC7466975}">
   <ds:schemaRefs>
     <ds:schemaRef ds:uri="http://schemas.microsoft.com/office/2006/metadata/contentType"/>
@@ -22295,14 +22011,6 @@
     <ds:schemaRef ds:uri="http://purl.org/dc/elements/1.1/"/>
     <ds:schemaRef ds:uri="http://purl.org/dc/terms/"/>
     <ds:schemaRef ds:uri="http://schemas.microsoft.com/internal/obd"/>
-  </ds:schemaRefs>
-</ds:datastoreItem>
-</file>
-
-<file path=customXml/itemProps2.xml><?xml version="1.0" encoding="utf-8"?>
-<ds:datastoreItem xmlns:ds="http://schemas.openxmlformats.org/officeDocument/2006/customXml" ds:itemID="{AE1F6106-C022-4D28-91C5-A026916BD284}">
-  <ds:schemaRefs>
-    <ds:schemaRef ds:uri="http://schemas.microsoft.com/sharepoint/v3/contenttype/forms"/>
   </ds:schemaRefs>
 </ds:datastoreItem>
 </file>

</xml_diff>